<commit_message>
ExHandPres, more about seh and finally code demonstration
</commit_message>
<xml_diff>
--- a/education/Exceptions_ in-depth_Presentation_Puhach_Ivan.pptx
+++ b/education/Exceptions_ in-depth_Presentation_Puhach_Ivan.pptx
@@ -7,21 +7,23 @@
     <p:sldMasterId id="2147483686" r:id="rId3"/>
   </p:sldMasterIdLst>
   <p:notesMasterIdLst>
-    <p:notesMasterId r:id="rId13"/>
+    <p:notesMasterId r:id="rId15"/>
   </p:notesMasterIdLst>
   <p:handoutMasterIdLst>
-    <p:handoutMasterId r:id="rId14"/>
+    <p:handoutMasterId r:id="rId16"/>
   </p:handoutMasterIdLst>
   <p:sldIdLst>
     <p:sldId id="287" r:id="rId4"/>
     <p:sldId id="268" r:id="rId5"/>
     <p:sldId id="267" r:id="rId6"/>
-    <p:sldId id="281" r:id="rId7"/>
-    <p:sldId id="282" r:id="rId8"/>
-    <p:sldId id="270" r:id="rId9"/>
-    <p:sldId id="288" r:id="rId10"/>
-    <p:sldId id="289" r:id="rId11"/>
-    <p:sldId id="262" r:id="rId12"/>
+    <p:sldId id="290" r:id="rId7"/>
+    <p:sldId id="281" r:id="rId8"/>
+    <p:sldId id="282" r:id="rId9"/>
+    <p:sldId id="270" r:id="rId10"/>
+    <p:sldId id="288" r:id="rId11"/>
+    <p:sldId id="289" r:id="rId12"/>
+    <p:sldId id="291" r:id="rId13"/>
+    <p:sldId id="262" r:id="rId14"/>
   </p:sldIdLst>
   <p:sldSz cx="9144000" cy="6858000" type="screen4x3"/>
   <p:notesSz cx="6858000" cy="9144000"/>
@@ -229,7 +231,7 @@
           <a:p>
             <a:fld id="{4DF7676A-16FE-41B0-990D-65C7DB39A42C}" type="datetimeFigureOut">
               <a:rPr lang="uk-UA" smtClean="0"/>
-              <a:t>22.10.2017</a:t>
+              <a:t>24.10.2017</a:t>
             </a:fld>
             <a:endParaRPr lang="uk-UA"/>
           </a:p>
@@ -394,7 +396,7 @@
           <a:p>
             <a:fld id="{749229DF-2266-4885-82A9-179B07419183}" type="datetimeFigureOut">
               <a:rPr lang="en-US" smtClean="0"/>
-              <a:t>10/22/2017</a:t>
+              <a:t>10/24/2017</a:t>
             </a:fld>
             <a:endParaRPr lang="en-US"/>
           </a:p>
@@ -924,89 +926,11 @@
           <a:p>
             <a:r>
               <a:rPr lang="ru-RU" dirty="0" smtClean="0"/>
-              <a:t> После того как код внутренних блоков </a:t>
-            </a:r>
-            <a:r>
-              <a:rPr lang="ru-RU" dirty="0" err="1" smtClean="0"/>
-              <a:t>finally</a:t>
-            </a:r>
-            <a:r>
-              <a:rPr lang="ru-RU" dirty="0" smtClean="0"/>
-              <a:t> будет выполнен, исполняется</a:t>
-            </a:r>
-          </a:p>
-          <a:p>
-            <a:r>
-              <a:rPr lang="ru-RU" dirty="0" smtClean="0"/>
-              <a:t>&gt; код из обрабатывающего блока </a:t>
-            </a:r>
-            <a:r>
-              <a:rPr lang="ru-RU" dirty="0" err="1" smtClean="0"/>
-              <a:t>catch</a:t>
-            </a:r>
-            <a:r>
-              <a:rPr lang="ru-RU" dirty="0" smtClean="0"/>
-              <a:t>. Здесь выбирается способ восстановления</a:t>
-            </a:r>
-          </a:p>
-          <a:p>
-            <a:r>
-              <a:rPr lang="ru-RU" dirty="0" smtClean="0"/>
-              <a:t>&gt; после исключения. Затем можно выбрать один из трех вариантов действий:</a:t>
-            </a:r>
-          </a:p>
-          <a:p>
-            <a:r>
-              <a:rPr lang="ru-RU" dirty="0" smtClean="0"/>
-              <a:t>&gt; ? еще раз сгенерировать то же исключение для передачи информации о нем коду,</a:t>
-            </a:r>
-          </a:p>
-          <a:p>
-            <a:r>
-              <a:rPr lang="ru-RU" dirty="0" smtClean="0"/>
-              <a:t>&gt; расположенному выше в стеке;</a:t>
-            </a:r>
-          </a:p>
-          <a:p>
-            <a:r>
-              <a:rPr lang="ru-RU" dirty="0" smtClean="0"/>
-              <a:t>&gt; ? сгенерировать исключение другого типа для передачи дополнительной </a:t>
-            </a:r>
-            <a:r>
-              <a:rPr lang="ru-RU" dirty="0" err="1" smtClean="0"/>
-              <a:t>инфор</a:t>
-            </a:r>
-            <a:r>
-              <a:rPr lang="ru-RU" dirty="0" smtClean="0"/>
-              <a:t>-</a:t>
-            </a:r>
-          </a:p>
-          <a:p>
-            <a:r>
-              <a:rPr lang="ru-RU" dirty="0" smtClean="0"/>
-              <a:t>&gt; </a:t>
-            </a:r>
-            <a:r>
-              <a:rPr lang="ru-RU" dirty="0" err="1" smtClean="0"/>
-              <a:t>мации</a:t>
-            </a:r>
-            <a:r>
-              <a:rPr lang="ru-RU" dirty="0" smtClean="0"/>
-              <a:t> коду, расположенному выше в стеке;</a:t>
-            </a:r>
-          </a:p>
-          <a:p>
-            <a:r>
-              <a:rPr lang="ru-RU" dirty="0" smtClean="0"/>
-              <a:t>&gt; ? позволить программному потоку выйти из блока </a:t>
-            </a:r>
-            <a:r>
-              <a:rPr lang="ru-RU" dirty="0" err="1" smtClean="0"/>
-              <a:t>catch</a:t>
-            </a:r>
-            <a:r>
-              <a:rPr lang="ru-RU" dirty="0" smtClean="0"/>
-              <a:t> естественным образом</a:t>
+              <a:t>На</a:t>
+            </a:r>
+            <a:r>
+              <a:rPr lang="ru-RU" baseline="0" dirty="0" smtClean="0"/>
+              <a:t> которой все чудесно показано</a:t>
             </a:r>
             <a:endParaRPr lang="en-US" dirty="0"/>
           </a:p>
@@ -1038,7 +962,7 @@
     </p:spTree>
     <p:extLst>
       <p:ext uri="{BB962C8B-B14F-4D97-AF65-F5344CB8AC3E}">
-        <p14:creationId xmlns:p14="http://schemas.microsoft.com/office/powerpoint/2010/main" val="1876722055"/>
+        <p14:creationId xmlns:p14="http://schemas.microsoft.com/office/powerpoint/2010/main" val="3436837728"/>
       </p:ext>
     </p:extLst>
   </p:cSld>
@@ -1094,21 +1018,7 @@
           <a:p>
             <a:r>
               <a:rPr lang="ru-RU" dirty="0" smtClean="0"/>
-              <a:t>Прерывание потока или выгрузка домена приложений является источником исключения</a:t>
-            </a:r>
-          </a:p>
-          <a:p>
-            <a:r>
-              <a:rPr lang="ru-RU" dirty="0" smtClean="0"/>
-              <a:t>&gt; </a:t>
-            </a:r>
-            <a:r>
-              <a:rPr lang="ru-RU" dirty="0" err="1" smtClean="0"/>
-              <a:t>ThreadAbortException</a:t>
-            </a:r>
-            <a:r>
-              <a:rPr lang="ru-RU" dirty="0" smtClean="0"/>
-              <a:t>, обеспечивающего выполнение блока </a:t>
+              <a:t> После того как код внутренних блоков </a:t>
             </a:r>
             <a:r>
               <a:rPr lang="ru-RU" dirty="0" err="1" smtClean="0"/>
@@ -1116,11 +1026,49 @@
             </a:r>
             <a:r>
               <a:rPr lang="ru-RU" dirty="0" smtClean="0"/>
-              <a:t>. Если же поток </a:t>
+              <a:t> будет выполнен, исполняется</a:t>
+            </a:r>
+          </a:p>
+          <a:p>
+            <a:r>
+              <a:rPr lang="ru-RU" dirty="0" smtClean="0"/>
+              <a:t>&gt; код из обрабатывающего блока </a:t>
             </a:r>
             <a:r>
               <a:rPr lang="ru-RU" dirty="0" err="1" smtClean="0"/>
-              <a:t>преры</a:t>
+              <a:t>catch</a:t>
+            </a:r>
+            <a:r>
+              <a:rPr lang="ru-RU" dirty="0" smtClean="0"/>
+              <a:t>. Здесь выбирается способ восстановления</a:t>
+            </a:r>
+          </a:p>
+          <a:p>
+            <a:r>
+              <a:rPr lang="ru-RU" dirty="0" smtClean="0"/>
+              <a:t>&gt; после исключения. Затем можно выбрать один из трех вариантов действий:</a:t>
+            </a:r>
+          </a:p>
+          <a:p>
+            <a:r>
+              <a:rPr lang="ru-RU" dirty="0" smtClean="0"/>
+              <a:t>&gt; ? еще раз сгенерировать то же исключение для передачи информации о нем коду,</a:t>
+            </a:r>
+          </a:p>
+          <a:p>
+            <a:r>
+              <a:rPr lang="ru-RU" dirty="0" smtClean="0"/>
+              <a:t>&gt; расположенному выше в стеке;</a:t>
+            </a:r>
+          </a:p>
+          <a:p>
+            <a:r>
+              <a:rPr lang="ru-RU" dirty="0" smtClean="0"/>
+              <a:t>&gt; ? сгенерировать исключение другого типа для передачи дополнительной </a:t>
+            </a:r>
+            <a:r>
+              <a:rPr lang="ru-RU" dirty="0" err="1" smtClean="0"/>
+              <a:t>инфор</a:t>
             </a:r>
             <a:r>
               <a:rPr lang="ru-RU" dirty="0" smtClean="0"/>
@@ -1134,153 +1082,27 @@
             </a:r>
             <a:r>
               <a:rPr lang="ru-RU" dirty="0" err="1" smtClean="0"/>
-              <a:t>вается</a:t>
-            </a:r>
-            <a:r>
-              <a:rPr lang="ru-RU" dirty="0" smtClean="0"/>
-              <a:t> функцией </a:t>
+              <a:t>мации</a:t>
+            </a:r>
+            <a:r>
+              <a:rPr lang="ru-RU" dirty="0" smtClean="0"/>
+              <a:t> коду, расположенному выше в стеке;</a:t>
+            </a:r>
+          </a:p>
+          <a:p>
+            <a:r>
+              <a:rPr lang="ru-RU" dirty="0" smtClean="0"/>
+              <a:t>&gt; ? позволить программному потоку выйти из блока </a:t>
             </a:r>
             <a:r>
               <a:rPr lang="ru-RU" dirty="0" err="1" smtClean="0"/>
-              <a:t>TerminateThread</a:t>
-            </a:r>
-            <a:r>
-              <a:rPr lang="ru-RU" dirty="0" smtClean="0"/>
-              <a:t> или методом </a:t>
-            </a:r>
-            <a:r>
-              <a:rPr lang="ru-RU" dirty="0" err="1" smtClean="0"/>
-              <a:t>FailFast</a:t>
-            </a:r>
-            <a:r>
-              <a:rPr lang="ru-RU" dirty="0" smtClean="0"/>
-              <a:t> класса </a:t>
-            </a:r>
-            <a:r>
-              <a:rPr lang="ru-RU" dirty="0" err="1" smtClean="0"/>
-              <a:t>System.Environment</a:t>
-            </a:r>
-            <a:r>
-              <a:rPr lang="ru-RU" dirty="0" smtClean="0"/>
-              <a:t>, блок</a:t>
-            </a:r>
-          </a:p>
-          <a:p>
-            <a:r>
-              <a:rPr lang="ru-RU" dirty="0" smtClean="0"/>
-              <a:t>&gt; </a:t>
-            </a:r>
-            <a:r>
-              <a:rPr lang="ru-RU" dirty="0" err="1" smtClean="0"/>
-              <a:t>finally</a:t>
-            </a:r>
-            <a:r>
-              <a:rPr lang="ru-RU" dirty="0" smtClean="0"/>
-              <a:t> не выполняется. Разумеется, </a:t>
-            </a:r>
-            <a:r>
-              <a:rPr lang="ru-RU" dirty="0" err="1" smtClean="0"/>
-              <a:t>Windows</a:t>
-            </a:r>
-            <a:r>
-              <a:rPr lang="ru-RU" dirty="0" smtClean="0"/>
-              <a:t> производит очистку всех ресурсов, которые</a:t>
-            </a:r>
-          </a:p>
-          <a:p>
-            <a:pPr marL="171450" indent="-171450">
-              <a:buFont typeface="Wingdings" panose="05000000000000000000" pitchFamily="2" charset="2"/>
-              <a:buChar char="Ø"/>
-            </a:pPr>
-            <a:r>
-              <a:rPr lang="ru-RU" dirty="0" smtClean="0"/>
-              <a:t>использовались </a:t>
-            </a:r>
-            <a:r>
-              <a:rPr lang="ru-RU" dirty="0" smtClean="0"/>
-              <a:t>прерванным процессом</a:t>
-            </a:r>
-            <a:r>
-              <a:rPr lang="ru-RU" dirty="0" smtClean="0"/>
-              <a:t>.</a:t>
-            </a:r>
-            <a:endParaRPr lang="en-US" dirty="0" smtClean="0"/>
-          </a:p>
-          <a:p>
-            <a:pPr marL="171450" indent="-171450">
-              <a:buFont typeface="Wingdings" panose="05000000000000000000" pitchFamily="2" charset="2"/>
-              <a:buChar char="Ø"/>
-            </a:pPr>
-            <a:endParaRPr lang="en-US" dirty="0" smtClean="0"/>
-          </a:p>
-          <a:p>
-            <a:r>
-              <a:rPr lang="ru-RU" dirty="0" smtClean="0"/>
-              <a:t>&gt; В CLR некоторые исключения, генерируемые машинным кодом, рассматриваются</a:t>
-            </a:r>
-          </a:p>
-          <a:p>
-            <a:r>
-              <a:rPr lang="ru-RU" dirty="0" smtClean="0"/>
-              <a:t>&gt; как исключения поврежденного состояния (</a:t>
-            </a:r>
-            <a:r>
-              <a:rPr lang="ru-RU" dirty="0" err="1" smtClean="0"/>
-              <a:t>Corrupted</a:t>
-            </a:r>
-            <a:r>
-              <a:rPr lang="ru-RU" dirty="0" smtClean="0"/>
-              <a:t> </a:t>
-            </a:r>
-            <a:r>
-              <a:rPr lang="ru-RU" dirty="0" err="1" smtClean="0"/>
-              <a:t>State</a:t>
-            </a:r>
-            <a:r>
-              <a:rPr lang="ru-RU" dirty="0" smtClean="0"/>
-              <a:t> </a:t>
-            </a:r>
-            <a:r>
-              <a:rPr lang="ru-RU" dirty="0" err="1" smtClean="0"/>
-              <a:t>Exceptions</a:t>
-            </a:r>
-            <a:r>
-              <a:rPr lang="ru-RU" dirty="0" smtClean="0"/>
-              <a:t>, CSE). Дело</a:t>
-            </a:r>
-          </a:p>
-          <a:p>
-            <a:r>
-              <a:rPr lang="ru-RU" dirty="0" smtClean="0"/>
-              <a:t>&gt; в том, что обычно они являются следствием проблем с CLR или с машинным кодом,</a:t>
-            </a:r>
-          </a:p>
-          <a:p>
-            <a:r>
-              <a:rPr lang="ru-RU" dirty="0" smtClean="0"/>
-              <a:t>&gt; неподконтрольных разработчику. По умолчанию CLR не позволяет управляемому</a:t>
-            </a:r>
-          </a:p>
-          <a:p>
-            <a:r>
-              <a:rPr lang="ru-RU" dirty="0" smtClean="0"/>
-              <a:t>&gt; коду перехватывать такие исключения и блок </a:t>
-            </a:r>
-            <a:r>
-              <a:rPr lang="ru-RU" dirty="0" err="1" smtClean="0"/>
-              <a:t>finally</a:t>
-            </a:r>
-            <a:r>
-              <a:rPr lang="ru-RU" dirty="0" smtClean="0"/>
-              <a:t> не выполняется. Вот список</a:t>
-            </a:r>
-          </a:p>
-          <a:p>
-            <a:r>
-              <a:rPr lang="ru-RU" dirty="0" smtClean="0"/>
-              <a:t>&gt; CSE-исключений в Win32.</a:t>
-            </a:r>
-            <a:endParaRPr lang="en-US" dirty="0" smtClean="0"/>
+              <a:t>catch</a:t>
+            </a:r>
+            <a:r>
+              <a:rPr lang="ru-RU" dirty="0" smtClean="0"/>
+              <a:t> естественным образом</a:t>
+            </a:r>
+            <a:endParaRPr lang="en-US" dirty="0"/>
           </a:p>
         </p:txBody>
       </p:sp>
@@ -1310,7 +1132,7 @@
     </p:spTree>
     <p:extLst>
       <p:ext uri="{BB962C8B-B14F-4D97-AF65-F5344CB8AC3E}">
-        <p14:creationId xmlns:p14="http://schemas.microsoft.com/office/powerpoint/2010/main" val="400917926"/>
+        <p14:creationId xmlns:p14="http://schemas.microsoft.com/office/powerpoint/2010/main" val="1876722055"/>
       </p:ext>
     </p:extLst>
   </p:cSld>
@@ -1364,64 +1186,77 @@
           <a:bodyPr/>
           <a:lstStyle/>
           <a:p>
-            <a:endParaRPr lang="ru-RU" dirty="0" smtClean="0"/>
-          </a:p>
-          <a:p>
-            <a:r>
-              <a:rPr lang="ru-RU" dirty="0" smtClean="0"/>
-              <a:t>&gt; Специалисты </a:t>
+            <a:r>
+              <a:rPr lang="ru-RU" dirty="0" smtClean="0"/>
+              <a:t>Прерывание потока или выгрузка домена приложений является источником исключения</a:t>
+            </a:r>
+          </a:p>
+          <a:p>
+            <a:r>
+              <a:rPr lang="ru-RU" dirty="0" smtClean="0"/>
+              <a:t>&gt; </a:t>
             </a:r>
             <a:r>
               <a:rPr lang="ru-RU" dirty="0" err="1" smtClean="0"/>
-              <a:t>Microsoft</a:t>
-            </a:r>
-            <a:r>
-              <a:rPr lang="ru-RU" dirty="0" smtClean="0"/>
-              <a:t> хотели сделать тип </a:t>
+              <a:t>ThreadAbortException</a:t>
+            </a:r>
+            <a:r>
+              <a:rPr lang="ru-RU" dirty="0" smtClean="0"/>
+              <a:t>, обеспечивающего выполнение блока </a:t>
             </a:r>
             <a:r>
               <a:rPr lang="ru-RU" dirty="0" err="1" smtClean="0"/>
-              <a:t>System.Exception</a:t>
-            </a:r>
-            <a:r>
-              <a:rPr lang="ru-RU" dirty="0" smtClean="0"/>
-              <a:t> базовым для</a:t>
-            </a:r>
-          </a:p>
-          <a:p>
-            <a:r>
-              <a:rPr lang="ru-RU" dirty="0" smtClean="0"/>
-              <a:t>&gt; всех исключений, а два других типа, </a:t>
+              <a:t>finally</a:t>
+            </a:r>
+            <a:r>
+              <a:rPr lang="ru-RU" dirty="0" smtClean="0"/>
+              <a:t>. Если же поток </a:t>
             </a:r>
             <a:r>
               <a:rPr lang="ru-RU" dirty="0" err="1" smtClean="0"/>
-              <a:t>System.SystemException</a:t>
-            </a:r>
-            <a:r>
-              <a:rPr lang="ru-RU" dirty="0" smtClean="0"/>
-              <a:t> и </a:t>
+              <a:t>преры</a:t>
+            </a:r>
+            <a:r>
+              <a:rPr lang="ru-RU" dirty="0" smtClean="0"/>
+              <a:t>-</a:t>
+            </a:r>
+          </a:p>
+          <a:p>
+            <a:r>
+              <a:rPr lang="ru-RU" dirty="0" smtClean="0"/>
+              <a:t>&gt; </a:t>
             </a:r>
             <a:r>
               <a:rPr lang="ru-RU" dirty="0" err="1" smtClean="0"/>
-              <a:t>System.ApplicationException</a:t>
-            </a:r>
-            <a:r>
-              <a:rPr lang="ru-RU" dirty="0" smtClean="0"/>
-              <a:t>,</a:t>
-            </a:r>
-          </a:p>
-          <a:p>
-            <a:r>
-              <a:rPr lang="ru-RU" dirty="0" smtClean="0"/>
-              <a:t>&gt; стали бы его непосредственными потомками. Кроме того, </a:t>
+              <a:t>вается</a:t>
+            </a:r>
+            <a:r>
+              <a:rPr lang="ru-RU" dirty="0" smtClean="0"/>
+              <a:t> функцией </a:t>
             </a:r>
             <a:r>
               <a:rPr lang="ru-RU" dirty="0" err="1" smtClean="0"/>
-              <a:t>исклю</a:t>
-            </a:r>
-            <a:r>
-              <a:rPr lang="ru-RU" dirty="0" smtClean="0"/>
-              <a:t>-</a:t>
+              <a:t>TerminateThread</a:t>
+            </a:r>
+            <a:r>
+              <a:rPr lang="ru-RU" dirty="0" smtClean="0"/>
+              <a:t> или методом </a:t>
+            </a:r>
+            <a:r>
+              <a:rPr lang="ru-RU" dirty="0" err="1" smtClean="0"/>
+              <a:t>FailFast</a:t>
+            </a:r>
+            <a:r>
+              <a:rPr lang="ru-RU" dirty="0" smtClean="0"/>
+              <a:t> класса </a:t>
+            </a:r>
+            <a:r>
+              <a:rPr lang="ru-RU" dirty="0" err="1" smtClean="0"/>
+              <a:t>System.Environment</a:t>
+            </a:r>
+            <a:r>
+              <a:rPr lang="ru-RU" dirty="0" smtClean="0"/>
+              <a:t>, блок</a:t>
             </a:r>
           </a:p>
           <a:p>
@@ -1431,173 +1266,107 @@
             </a:r>
             <a:r>
               <a:rPr lang="ru-RU" dirty="0" err="1" smtClean="0"/>
-              <a:t>чения</a:t>
-            </a:r>
-            <a:r>
-              <a:rPr lang="ru-RU" dirty="0" smtClean="0"/>
-              <a:t>, вброшенные CLR, стали бы производными от типа </a:t>
+              <a:t>finally</a:t>
+            </a:r>
+            <a:r>
+              <a:rPr lang="ru-RU" dirty="0" smtClean="0"/>
+              <a:t> не выполняется. Разумеется, </a:t>
             </a:r>
             <a:r>
               <a:rPr lang="ru-RU" dirty="0" err="1" smtClean="0"/>
-              <a:t>SystemException</a:t>
-            </a:r>
-            <a:r>
-              <a:rPr lang="ru-RU" dirty="0" smtClean="0"/>
-              <a:t>, в то</a:t>
-            </a:r>
-          </a:p>
-          <a:p>
-            <a:r>
-              <a:rPr lang="ru-RU" dirty="0" smtClean="0"/>
-              <a:t>&gt; время как исключения, появившиеся в приложениях, должны были наследовать</a:t>
-            </a:r>
-          </a:p>
-          <a:p>
-            <a:r>
-              <a:rPr lang="ru-RU" dirty="0" smtClean="0"/>
-              <a:t>&gt; от </a:t>
+              <a:t>Windows</a:t>
+            </a:r>
+            <a:r>
+              <a:rPr lang="ru-RU" dirty="0" smtClean="0"/>
+              <a:t> производит очистку всех ресурсов, которые</a:t>
+            </a:r>
+          </a:p>
+          <a:p>
+            <a:pPr marL="171450" indent="-171450">
+              <a:buFont typeface="Wingdings" panose="05000000000000000000" pitchFamily="2" charset="2"/>
+              <a:buChar char="Ø"/>
+            </a:pPr>
+            <a:r>
+              <a:rPr lang="ru-RU" dirty="0" smtClean="0"/>
+              <a:t>использовались прерванным процессом.</a:t>
+            </a:r>
+            <a:endParaRPr lang="en-US" dirty="0" smtClean="0"/>
+          </a:p>
+          <a:p>
+            <a:pPr marL="171450" indent="-171450">
+              <a:buFont typeface="Wingdings" panose="05000000000000000000" pitchFamily="2" charset="2"/>
+              <a:buChar char="Ø"/>
+            </a:pPr>
+            <a:endParaRPr lang="en-US" dirty="0" smtClean="0"/>
+          </a:p>
+          <a:p>
+            <a:r>
+              <a:rPr lang="ru-RU" dirty="0" smtClean="0"/>
+              <a:t>&gt; В CLR некоторые исключения, генерируемые машинным кодом, рассматриваются</a:t>
+            </a:r>
+          </a:p>
+          <a:p>
+            <a:r>
+              <a:rPr lang="ru-RU" dirty="0" smtClean="0"/>
+              <a:t>&gt; как исключения поврежденного состояния (</a:t>
             </a:r>
             <a:r>
               <a:rPr lang="ru-RU" dirty="0" err="1" smtClean="0"/>
-              <a:t>ApplicationException</a:t>
-            </a:r>
-            <a:r>
-              <a:rPr lang="ru-RU" dirty="0" smtClean="0"/>
-              <a:t>. Это дало бы возможность написать блок </a:t>
+              <a:t>Corrupted</a:t>
+            </a:r>
+            <a:r>
+              <a:rPr lang="ru-RU" dirty="0" smtClean="0"/>
+              <a:t> </a:t>
             </a:r>
             <a:r>
               <a:rPr lang="ru-RU" dirty="0" err="1" smtClean="0"/>
-              <a:t>catch</a:t>
-            </a:r>
-            <a:r>
-              <a:rPr lang="ru-RU" dirty="0" smtClean="0"/>
-              <a:t>, пере-</a:t>
-            </a:r>
-          </a:p>
-          <a:p>
-            <a:r>
-              <a:rPr lang="ru-RU" dirty="0" smtClean="0"/>
-              <a:t>&gt; </a:t>
+              <a:t>State</a:t>
+            </a:r>
+            <a:r>
+              <a:rPr lang="ru-RU" dirty="0" smtClean="0"/>
+              <a:t> </a:t>
             </a:r>
             <a:r>
               <a:rPr lang="ru-RU" dirty="0" err="1" smtClean="0"/>
-              <a:t>хватывающий</a:t>
-            </a:r>
-            <a:r>
-              <a:rPr lang="ru-RU" dirty="0" smtClean="0"/>
-              <a:t> как все CLR-исключения, так и все исключения приложений.</a:t>
-            </a:r>
-          </a:p>
-          <a:p>
-            <a:r>
-              <a:rPr lang="ru-RU" dirty="0" smtClean="0"/>
-              <a:t>&gt; Однако на практике это правило соблюдается не полностью; некоторые </a:t>
+              <a:t>Exceptions</a:t>
+            </a:r>
+            <a:r>
+              <a:rPr lang="ru-RU" dirty="0" smtClean="0"/>
+              <a:t>, CSE). Дело</a:t>
+            </a:r>
+          </a:p>
+          <a:p>
+            <a:r>
+              <a:rPr lang="ru-RU" dirty="0" smtClean="0"/>
+              <a:t>&gt; в том, что обычно они являются следствием проблем с CLR или с машинным кодом,</a:t>
+            </a:r>
+          </a:p>
+          <a:p>
+            <a:r>
+              <a:rPr lang="ru-RU" dirty="0" smtClean="0"/>
+              <a:t>&gt; неподконтрольных разработчику. По умолчанию CLR не позволяет управляемому</a:t>
+            </a:r>
+          </a:p>
+          <a:p>
+            <a:r>
+              <a:rPr lang="ru-RU" dirty="0" smtClean="0"/>
+              <a:t>&gt; коду перехватывать такие исключения и блок </a:t>
             </a:r>
             <a:r>
               <a:rPr lang="ru-RU" dirty="0" err="1" smtClean="0"/>
-              <a:t>ис</a:t>
-            </a:r>
-            <a:r>
-              <a:rPr lang="ru-RU" dirty="0" smtClean="0"/>
-              <a:t>-</a:t>
-            </a:r>
-          </a:p>
-          <a:p>
-            <a:r>
-              <a:rPr lang="ru-RU" dirty="0" smtClean="0"/>
-              <a:t>&gt; </a:t>
-            </a:r>
-            <a:r>
-              <a:rPr lang="ru-RU" dirty="0" err="1" smtClean="0"/>
-              <a:t>ключения</a:t>
-            </a:r>
-            <a:r>
-              <a:rPr lang="ru-RU" dirty="0" smtClean="0"/>
-              <a:t> являются прямыми потомками типа </a:t>
-            </a:r>
-            <a:r>
-              <a:rPr lang="ru-RU" dirty="0" err="1" smtClean="0"/>
-              <a:t>Exception</a:t>
-            </a:r>
-            <a:r>
-              <a:rPr lang="ru-RU" dirty="0" smtClean="0"/>
-              <a:t> (</a:t>
-            </a:r>
-            <a:r>
-              <a:rPr lang="ru-RU" dirty="0" err="1" smtClean="0"/>
-              <a:t>IsolatedStorageException</a:t>
-            </a:r>
-            <a:r>
-              <a:rPr lang="ru-RU" dirty="0" smtClean="0"/>
-              <a:t>),</a:t>
-            </a:r>
-          </a:p>
-          <a:p>
-            <a:r>
-              <a:rPr lang="ru-RU" dirty="0" smtClean="0"/>
-              <a:t>&gt; некоторые CLR-исключения наследуют от типа </a:t>
-            </a:r>
-            <a:r>
-              <a:rPr lang="ru-RU" dirty="0" err="1" smtClean="0"/>
-              <a:t>ApplicationException</a:t>
-            </a:r>
-            <a:endParaRPr lang="ru-RU" dirty="0" smtClean="0"/>
-          </a:p>
-          <a:p>
-            <a:r>
-              <a:rPr lang="ru-RU" dirty="0" smtClean="0"/>
-              <a:t>&gt; (</a:t>
-            </a:r>
-            <a:r>
-              <a:rPr lang="ru-RU" dirty="0" err="1" smtClean="0"/>
-              <a:t>TargetInvocationException</a:t>
-            </a:r>
-            <a:r>
-              <a:rPr lang="ru-RU" dirty="0" smtClean="0"/>
-              <a:t>), а некоторые исключения приложений — от типа</a:t>
-            </a:r>
-          </a:p>
-          <a:p>
-            <a:r>
-              <a:rPr lang="ru-RU" dirty="0" smtClean="0"/>
-              <a:t>&gt; </a:t>
-            </a:r>
-            <a:r>
-              <a:rPr lang="ru-RU" dirty="0" err="1" smtClean="0"/>
-              <a:t>SystemException</a:t>
-            </a:r>
-            <a:r>
-              <a:rPr lang="ru-RU" dirty="0" smtClean="0"/>
-              <a:t> (</a:t>
-            </a:r>
-            <a:r>
-              <a:rPr lang="ru-RU" dirty="0" err="1" smtClean="0"/>
-              <a:t>FormatException</a:t>
-            </a:r>
-            <a:r>
-              <a:rPr lang="ru-RU" dirty="0" smtClean="0"/>
-              <a:t>). Из-за этой путаницы типы </a:t>
-            </a:r>
-            <a:r>
-              <a:rPr lang="ru-RU" dirty="0" err="1" smtClean="0"/>
-              <a:t>SystemException</a:t>
-            </a:r>
-            <a:endParaRPr lang="ru-RU" dirty="0" smtClean="0"/>
-          </a:p>
-          <a:p>
-            <a:r>
-              <a:rPr lang="ru-RU" dirty="0" smtClean="0"/>
-              <a:t>&gt; и </a:t>
-            </a:r>
-            <a:r>
-              <a:rPr lang="ru-RU" dirty="0" err="1" smtClean="0"/>
-              <a:t>ApplicationException</a:t>
-            </a:r>
-            <a:r>
-              <a:rPr lang="ru-RU" dirty="0" smtClean="0"/>
-              <a:t> не несут никакой особой смысловой нагрузки.</a:t>
-            </a:r>
-            <a:endParaRPr lang="en-US" dirty="0"/>
+              <a:t>finally</a:t>
+            </a:r>
+            <a:r>
+              <a:rPr lang="ru-RU" dirty="0" smtClean="0"/>
+              <a:t> не выполняется. Вот список</a:t>
+            </a:r>
+          </a:p>
+          <a:p>
+            <a:r>
+              <a:rPr lang="ru-RU" dirty="0" smtClean="0"/>
+              <a:t>&gt; CSE-исключений в Win32.</a:t>
+            </a:r>
+            <a:endParaRPr lang="en-US" dirty="0" smtClean="0"/>
           </a:p>
         </p:txBody>
       </p:sp>
@@ -1627,7 +1396,7 @@
     </p:spTree>
     <p:extLst>
       <p:ext uri="{BB962C8B-B14F-4D97-AF65-F5344CB8AC3E}">
-        <p14:creationId xmlns:p14="http://schemas.microsoft.com/office/powerpoint/2010/main" val="2850307519"/>
+        <p14:creationId xmlns:p14="http://schemas.microsoft.com/office/powerpoint/2010/main" val="400917926"/>
       </p:ext>
     </p:extLst>
   </p:cSld>
@@ -1681,21 +1450,38 @@
           <a:bodyPr/>
           <a:lstStyle/>
           <a:p>
-            <a:r>
-              <a:rPr lang="ru-RU" dirty="0" smtClean="0"/>
-              <a:t>&gt; Например, в C# при использовании инструкций </a:t>
+            <a:endParaRPr lang="ru-RU" dirty="0" smtClean="0"/>
+          </a:p>
+          <a:p>
+            <a:r>
+              <a:rPr lang="ru-RU" dirty="0" smtClean="0"/>
+              <a:t>&gt; Специалисты </a:t>
             </a:r>
             <a:r>
               <a:rPr lang="ru-RU" dirty="0" err="1" smtClean="0"/>
-              <a:t>lock</a:t>
-            </a:r>
-            <a:r>
-              <a:rPr lang="ru-RU" dirty="0" smtClean="0"/>
-              <a:t>, </a:t>
+              <a:t>Microsoft</a:t>
+            </a:r>
+            <a:r>
+              <a:rPr lang="ru-RU" dirty="0" smtClean="0"/>
+              <a:t> хотели сделать тип </a:t>
             </a:r>
             <a:r>
               <a:rPr lang="ru-RU" dirty="0" err="1" smtClean="0"/>
-              <a:t>using</a:t>
+              <a:t>System.Exception</a:t>
+            </a:r>
+            <a:r>
+              <a:rPr lang="ru-RU" dirty="0" smtClean="0"/>
+              <a:t> базовым для</a:t>
+            </a:r>
+          </a:p>
+          <a:p>
+            <a:r>
+              <a:rPr lang="ru-RU" dirty="0" smtClean="0"/>
+              <a:t>&gt; всех исключений, а два других типа, </a:t>
+            </a:r>
+            <a:r>
+              <a:rPr lang="ru-RU" dirty="0" err="1" smtClean="0"/>
+              <a:t>System.SystemException</a:t>
             </a:r>
             <a:r>
               <a:rPr lang="ru-RU" dirty="0" smtClean="0"/>
@@ -1703,55 +1489,75 @@
             </a:r>
             <a:r>
               <a:rPr lang="ru-RU" dirty="0" err="1" smtClean="0"/>
-              <a:t>foreach</a:t>
-            </a:r>
-            <a:r>
-              <a:rPr lang="ru-RU" dirty="0" smtClean="0"/>
-              <a:t>&gt;  блоки </a:t>
+              <a:t>System.ApplicationException</a:t>
+            </a:r>
+            <a:r>
+              <a:rPr lang="ru-RU" dirty="0" smtClean="0"/>
+              <a:t>,</a:t>
+            </a:r>
+          </a:p>
+          <a:p>
+            <a:r>
+              <a:rPr lang="ru-RU" dirty="0" smtClean="0"/>
+              <a:t>&gt; стали бы его непосредственными потомками. Кроме того, </a:t>
             </a:r>
             <a:r>
               <a:rPr lang="ru-RU" dirty="0" err="1" smtClean="0"/>
-              <a:t>try</a:t>
-            </a:r>
-            <a:r>
-              <a:rPr lang="ru-RU" dirty="0" smtClean="0"/>
-              <a:t>/</a:t>
+              <a:t>исклю</a:t>
+            </a:r>
+            <a:r>
+              <a:rPr lang="ru-RU" dirty="0" smtClean="0"/>
+              <a:t>-</a:t>
+            </a:r>
+          </a:p>
+          <a:p>
+            <a:r>
+              <a:rPr lang="ru-RU" dirty="0" smtClean="0"/>
+              <a:t>&gt; </a:t>
             </a:r>
             <a:r>
               <a:rPr lang="ru-RU" dirty="0" err="1" smtClean="0"/>
-              <a:t>finally</a:t>
-            </a:r>
-            <a:r>
-              <a:rPr lang="ru-RU" dirty="0" smtClean="0"/>
-              <a:t> создаются автоматически. Компилятор строит эти блоки и при</a:t>
-            </a:r>
-          </a:p>
-          <a:p>
-            <a:r>
-              <a:rPr lang="ru-RU" dirty="0" smtClean="0"/>
-              <a:t>&gt; переопределении деструктора класса (метод </a:t>
+              <a:t>чения</a:t>
+            </a:r>
+            <a:r>
+              <a:rPr lang="ru-RU" dirty="0" smtClean="0"/>
+              <a:t>, вброшенные CLR, стали бы производными от типа </a:t>
             </a:r>
             <a:r>
               <a:rPr lang="ru-RU" dirty="0" err="1" smtClean="0"/>
-              <a:t>Finalize</a:t>
-            </a:r>
-            <a:r>
-              <a:rPr lang="ru-RU" dirty="0" smtClean="0"/>
-              <a:t>). При работе с упомянутыми</a:t>
-            </a:r>
-          </a:p>
-          <a:p>
-            <a:r>
-              <a:rPr lang="ru-RU" dirty="0" smtClean="0"/>
-              <a:t>&gt; конструкциями написанный вами код помещается в блок </a:t>
+              <a:t>SystemException</a:t>
+            </a:r>
+            <a:r>
+              <a:rPr lang="ru-RU" dirty="0" smtClean="0"/>
+              <a:t>, в то</a:t>
+            </a:r>
+          </a:p>
+          <a:p>
+            <a:r>
+              <a:rPr lang="ru-RU" dirty="0" smtClean="0"/>
+              <a:t>&gt; время как исключения, появившиеся в приложениях, должны были наследовать</a:t>
+            </a:r>
+          </a:p>
+          <a:p>
+            <a:r>
+              <a:rPr lang="ru-RU" dirty="0" smtClean="0"/>
+              <a:t>&gt; от </a:t>
             </a:r>
             <a:r>
               <a:rPr lang="ru-RU" dirty="0" err="1" smtClean="0"/>
-              <a:t>try</a:t>
-            </a:r>
-            <a:r>
-              <a:rPr lang="ru-RU" dirty="0" smtClean="0"/>
-              <a:t>, а код очистки — в блок</a:t>
+              <a:t>ApplicationException</a:t>
+            </a:r>
+            <a:r>
+              <a:rPr lang="ru-RU" dirty="0" smtClean="0"/>
+              <a:t>. Это дало бы возможность написать блок </a:t>
+            </a:r>
+            <a:r>
+              <a:rPr lang="ru-RU" dirty="0" err="1" smtClean="0"/>
+              <a:t>catch</a:t>
+            </a:r>
+            <a:r>
+              <a:rPr lang="ru-RU" dirty="0" smtClean="0"/>
+              <a:t>, пере-</a:t>
             </a:r>
           </a:p>
           <a:p>
@@ -1761,147 +1567,121 @@
             </a:r>
             <a:r>
               <a:rPr lang="ru-RU" dirty="0" err="1" smtClean="0"/>
-              <a:t>finally</a:t>
-            </a:r>
-            <a:r>
-              <a:rPr lang="ru-RU" dirty="0" smtClean="0"/>
-              <a:t>. А именно:</a:t>
-            </a:r>
-          </a:p>
-          <a:p>
-            <a:r>
-              <a:rPr lang="ru-RU" dirty="0" smtClean="0"/>
-              <a:t>&gt; ? если вы используете инструкцию </a:t>
+              <a:t>хватывающий</a:t>
+            </a:r>
+            <a:r>
+              <a:rPr lang="ru-RU" dirty="0" smtClean="0"/>
+              <a:t> как все CLR-исключения, так и все исключения приложений.</a:t>
+            </a:r>
+          </a:p>
+          <a:p>
+            <a:r>
+              <a:rPr lang="ru-RU" dirty="0" smtClean="0"/>
+              <a:t>&gt; Однако на практике это правило соблюдается не полностью; некоторые </a:t>
             </a:r>
             <a:r>
               <a:rPr lang="ru-RU" dirty="0" err="1" smtClean="0"/>
-              <a:t>lock</a:t>
-            </a:r>
-            <a:r>
-              <a:rPr lang="ru-RU" dirty="0" smtClean="0"/>
-              <a:t>, то внутри блока </a:t>
+              <a:t>ис</a:t>
+            </a:r>
+            <a:r>
+              <a:rPr lang="ru-RU" dirty="0" smtClean="0"/>
+              <a:t>-</a:t>
+            </a:r>
+          </a:p>
+          <a:p>
+            <a:r>
+              <a:rPr lang="ru-RU" dirty="0" smtClean="0"/>
+              <a:t>&gt; </a:t>
             </a:r>
             <a:r>
               <a:rPr lang="ru-RU" dirty="0" err="1" smtClean="0"/>
-              <a:t>finally</a:t>
-            </a:r>
-            <a:r>
-              <a:rPr lang="ru-RU" dirty="0" smtClean="0"/>
-              <a:t> снимается</a:t>
-            </a:r>
-          </a:p>
-          <a:p>
-            <a:r>
-              <a:rPr lang="ru-RU" dirty="0" smtClean="0"/>
-              <a:t>&gt; блокировка;</a:t>
-            </a:r>
-          </a:p>
-          <a:p>
-            <a:r>
-              <a:rPr lang="ru-RU" dirty="0" smtClean="0"/>
-              <a:t>&gt; ? если вы используете инструкцию </a:t>
+              <a:t>ключения</a:t>
+            </a:r>
+            <a:r>
+              <a:rPr lang="ru-RU" dirty="0" smtClean="0"/>
+              <a:t> являются прямыми потомками типа </a:t>
             </a:r>
             <a:r>
               <a:rPr lang="ru-RU" dirty="0" err="1" smtClean="0"/>
-              <a:t>using</a:t>
-            </a:r>
-            <a:r>
-              <a:rPr lang="ru-RU" dirty="0" smtClean="0"/>
-              <a:t>, то внутри блока </a:t>
+              <a:t>Exception</a:t>
+            </a:r>
+            <a:r>
+              <a:rPr lang="ru-RU" dirty="0" smtClean="0"/>
+              <a:t> (</a:t>
             </a:r>
             <a:r>
               <a:rPr lang="ru-RU" dirty="0" err="1" smtClean="0"/>
-              <a:t>finally</a:t>
-            </a:r>
-            <a:r>
-              <a:rPr lang="ru-RU" dirty="0" smtClean="0"/>
-              <a:t> для объекта</a:t>
-            </a:r>
-          </a:p>
-          <a:p>
-            <a:r>
-              <a:rPr lang="ru-RU" dirty="0" smtClean="0"/>
-              <a:t>&gt; вызывается метод </a:t>
+              <a:t>IsolatedStorageException</a:t>
+            </a:r>
+            <a:r>
+              <a:rPr lang="ru-RU" dirty="0" smtClean="0"/>
+              <a:t>),</a:t>
+            </a:r>
+          </a:p>
+          <a:p>
+            <a:r>
+              <a:rPr lang="ru-RU" dirty="0" smtClean="0"/>
+              <a:t>&gt; некоторые CLR-исключения наследуют от типа </a:t>
             </a:r>
             <a:r>
               <a:rPr lang="ru-RU" dirty="0" err="1" smtClean="0"/>
-              <a:t>Dispose</a:t>
-            </a:r>
-            <a:r>
-              <a:rPr lang="ru-RU" dirty="0" smtClean="0"/>
-              <a:t>;</a:t>
-            </a:r>
-          </a:p>
-          <a:p>
-            <a:r>
-              <a:rPr lang="ru-RU" dirty="0" smtClean="0"/>
-              <a:t>&gt; ? если вы используете инструкцию </a:t>
+              <a:t>ApplicationException</a:t>
+            </a:r>
+            <a:endParaRPr lang="ru-RU" dirty="0" smtClean="0"/>
+          </a:p>
+          <a:p>
+            <a:r>
+              <a:rPr lang="ru-RU" dirty="0" smtClean="0"/>
+              <a:t>&gt; (</a:t>
             </a:r>
             <a:r>
               <a:rPr lang="ru-RU" dirty="0" err="1" smtClean="0"/>
-              <a:t>foreach</a:t>
-            </a:r>
-            <a:r>
-              <a:rPr lang="ru-RU" dirty="0" smtClean="0"/>
-              <a:t>, то внутри блока </a:t>
+              <a:t>TargetInvocationException</a:t>
+            </a:r>
+            <a:r>
+              <a:rPr lang="ru-RU" dirty="0" smtClean="0"/>
+              <a:t>), а некоторые исключения приложений — от типа</a:t>
+            </a:r>
+          </a:p>
+          <a:p>
+            <a:r>
+              <a:rPr lang="ru-RU" dirty="0" smtClean="0"/>
+              <a:t>&gt; </a:t>
             </a:r>
             <a:r>
               <a:rPr lang="ru-RU" dirty="0" err="1" smtClean="0"/>
-              <a:t>finally</a:t>
-            </a:r>
-            <a:r>
-              <a:rPr lang="ru-RU" dirty="0" smtClean="0"/>
-              <a:t> для объекта</a:t>
-            </a:r>
-          </a:p>
-          <a:p>
-            <a:r>
-              <a:rPr lang="ru-RU" dirty="0" smtClean="0"/>
-              <a:t>&gt; </a:t>
+              <a:t>SystemException</a:t>
+            </a:r>
+            <a:r>
+              <a:rPr lang="ru-RU" dirty="0" smtClean="0"/>
+              <a:t> (</a:t>
             </a:r>
             <a:r>
               <a:rPr lang="ru-RU" dirty="0" err="1" smtClean="0"/>
-              <a:t>IEnumerator</a:t>
-            </a:r>
-            <a:r>
-              <a:rPr lang="ru-RU" dirty="0" smtClean="0"/>
-              <a:t> вызывается метод </a:t>
+              <a:t>FormatException</a:t>
+            </a:r>
+            <a:r>
+              <a:rPr lang="ru-RU" dirty="0" smtClean="0"/>
+              <a:t>). Из-за этой путаницы типы </a:t>
             </a:r>
             <a:r>
               <a:rPr lang="ru-RU" dirty="0" err="1" smtClean="0"/>
-              <a:t>Dispose</a:t>
-            </a:r>
-            <a:r>
-              <a:rPr lang="ru-RU" dirty="0" smtClean="0"/>
-              <a:t>;</a:t>
-            </a:r>
-          </a:p>
-          <a:p>
-            <a:r>
-              <a:rPr lang="ru-RU" dirty="0" smtClean="0"/>
-              <a:t>&gt; ? если вы определяете деструктор, то внутри блока </a:t>
+              <a:t>SystemException</a:t>
+            </a:r>
+            <a:endParaRPr lang="ru-RU" dirty="0" smtClean="0"/>
+          </a:p>
+          <a:p>
+            <a:r>
+              <a:rPr lang="ru-RU" dirty="0" smtClean="0"/>
+              <a:t>&gt; и </a:t>
             </a:r>
             <a:r>
               <a:rPr lang="ru-RU" dirty="0" err="1" smtClean="0"/>
-              <a:t>finally</a:t>
-            </a:r>
-            <a:r>
-              <a:rPr lang="ru-RU" dirty="0" smtClean="0"/>
-              <a:t> вызывается метод</a:t>
-            </a:r>
-          </a:p>
-          <a:p>
-            <a:r>
-              <a:rPr lang="ru-RU" dirty="0" smtClean="0"/>
-              <a:t>&gt; </a:t>
-            </a:r>
-            <a:r>
-              <a:rPr lang="ru-RU" dirty="0" err="1" smtClean="0"/>
-              <a:t>Finalize</a:t>
-            </a:r>
-            <a:r>
-              <a:rPr lang="ru-RU" dirty="0" smtClean="0"/>
-              <a:t> базового класса.</a:t>
+              <a:t>ApplicationException</a:t>
+            </a:r>
+            <a:r>
+              <a:rPr lang="ru-RU" dirty="0" smtClean="0"/>
+              <a:t> не несут никакой особой смысловой нагрузки.</a:t>
             </a:r>
             <a:endParaRPr lang="en-US" dirty="0"/>
           </a:p>
@@ -1933,7 +1713,7 @@
     </p:spTree>
     <p:extLst>
       <p:ext uri="{BB962C8B-B14F-4D97-AF65-F5344CB8AC3E}">
-        <p14:creationId xmlns:p14="http://schemas.microsoft.com/office/powerpoint/2010/main" val="1860067769"/>
+        <p14:creationId xmlns:p14="http://schemas.microsoft.com/office/powerpoint/2010/main" val="2850307519"/>
       </p:ext>
     </p:extLst>
   </p:cSld>
@@ -1987,6 +1767,228 @@
           <a:bodyPr/>
           <a:lstStyle/>
           <a:p>
+            <a:r>
+              <a:rPr lang="ru-RU" dirty="0" smtClean="0"/>
+              <a:t>&gt; Например, в C# при использовании инструкций </a:t>
+            </a:r>
+            <a:r>
+              <a:rPr lang="ru-RU" dirty="0" err="1" smtClean="0"/>
+              <a:t>lock</a:t>
+            </a:r>
+            <a:r>
+              <a:rPr lang="ru-RU" dirty="0" smtClean="0"/>
+              <a:t>, </a:t>
+            </a:r>
+            <a:r>
+              <a:rPr lang="ru-RU" dirty="0" err="1" smtClean="0"/>
+              <a:t>using</a:t>
+            </a:r>
+            <a:r>
+              <a:rPr lang="ru-RU" dirty="0" smtClean="0"/>
+              <a:t> и </a:t>
+            </a:r>
+            <a:r>
+              <a:rPr lang="ru-RU" dirty="0" err="1" smtClean="0"/>
+              <a:t>foreach</a:t>
+            </a:r>
+            <a:r>
+              <a:rPr lang="ru-RU" dirty="0" smtClean="0"/>
+              <a:t>&gt;  блоки </a:t>
+            </a:r>
+            <a:r>
+              <a:rPr lang="ru-RU" dirty="0" err="1" smtClean="0"/>
+              <a:t>try</a:t>
+            </a:r>
+            <a:r>
+              <a:rPr lang="ru-RU" dirty="0" smtClean="0"/>
+              <a:t>/</a:t>
+            </a:r>
+            <a:r>
+              <a:rPr lang="ru-RU" dirty="0" err="1" smtClean="0"/>
+              <a:t>finally</a:t>
+            </a:r>
+            <a:r>
+              <a:rPr lang="ru-RU" dirty="0" smtClean="0"/>
+              <a:t> создаются автоматически. Компилятор строит эти блоки и при</a:t>
+            </a:r>
+          </a:p>
+          <a:p>
+            <a:r>
+              <a:rPr lang="ru-RU" dirty="0" smtClean="0"/>
+              <a:t>&gt; переопределении деструктора класса (метод </a:t>
+            </a:r>
+            <a:r>
+              <a:rPr lang="ru-RU" dirty="0" err="1" smtClean="0"/>
+              <a:t>Finalize</a:t>
+            </a:r>
+            <a:r>
+              <a:rPr lang="ru-RU" dirty="0" smtClean="0"/>
+              <a:t>). При работе с упомянутыми</a:t>
+            </a:r>
+          </a:p>
+          <a:p>
+            <a:r>
+              <a:rPr lang="ru-RU" dirty="0" smtClean="0"/>
+              <a:t>&gt; конструкциями написанный вами код помещается в блок </a:t>
+            </a:r>
+            <a:r>
+              <a:rPr lang="ru-RU" dirty="0" err="1" smtClean="0"/>
+              <a:t>try</a:t>
+            </a:r>
+            <a:r>
+              <a:rPr lang="ru-RU" dirty="0" smtClean="0"/>
+              <a:t>, а код очистки — в блок</a:t>
+            </a:r>
+          </a:p>
+          <a:p>
+            <a:r>
+              <a:rPr lang="ru-RU" dirty="0" smtClean="0"/>
+              <a:t>&gt; </a:t>
+            </a:r>
+            <a:r>
+              <a:rPr lang="ru-RU" dirty="0" err="1" smtClean="0"/>
+              <a:t>finally</a:t>
+            </a:r>
+            <a:r>
+              <a:rPr lang="ru-RU" dirty="0" smtClean="0"/>
+              <a:t>. А именно:</a:t>
+            </a:r>
+          </a:p>
+          <a:p>
+            <a:r>
+              <a:rPr lang="ru-RU" dirty="0" smtClean="0"/>
+              <a:t>&gt; ? если вы используете инструкцию </a:t>
+            </a:r>
+            <a:r>
+              <a:rPr lang="ru-RU" dirty="0" err="1" smtClean="0"/>
+              <a:t>lock</a:t>
+            </a:r>
+            <a:r>
+              <a:rPr lang="ru-RU" dirty="0" smtClean="0"/>
+              <a:t>, то внутри блока </a:t>
+            </a:r>
+            <a:r>
+              <a:rPr lang="ru-RU" dirty="0" err="1" smtClean="0"/>
+              <a:t>finally</a:t>
+            </a:r>
+            <a:r>
+              <a:rPr lang="ru-RU" dirty="0" smtClean="0"/>
+              <a:t> снимается</a:t>
+            </a:r>
+          </a:p>
+          <a:p>
+            <a:r>
+              <a:rPr lang="ru-RU" dirty="0" smtClean="0"/>
+              <a:t>&gt; блокировка;</a:t>
+            </a:r>
+          </a:p>
+          <a:p>
+            <a:r>
+              <a:rPr lang="ru-RU" dirty="0" smtClean="0"/>
+              <a:t>&gt; ? если вы используете инструкцию </a:t>
+            </a:r>
+            <a:r>
+              <a:rPr lang="ru-RU" dirty="0" err="1" smtClean="0"/>
+              <a:t>using</a:t>
+            </a:r>
+            <a:r>
+              <a:rPr lang="ru-RU" dirty="0" smtClean="0"/>
+              <a:t>, то внутри блока </a:t>
+            </a:r>
+            <a:r>
+              <a:rPr lang="ru-RU" dirty="0" err="1" smtClean="0"/>
+              <a:t>finally</a:t>
+            </a:r>
+            <a:r>
+              <a:rPr lang="ru-RU" dirty="0" smtClean="0"/>
+              <a:t> для объекта</a:t>
+            </a:r>
+          </a:p>
+          <a:p>
+            <a:r>
+              <a:rPr lang="ru-RU" dirty="0" smtClean="0"/>
+              <a:t>&gt; вызывается метод </a:t>
+            </a:r>
+            <a:r>
+              <a:rPr lang="ru-RU" dirty="0" err="1" smtClean="0"/>
+              <a:t>Dispose</a:t>
+            </a:r>
+            <a:r>
+              <a:rPr lang="ru-RU" dirty="0" smtClean="0"/>
+              <a:t>;</a:t>
+            </a:r>
+          </a:p>
+          <a:p>
+            <a:r>
+              <a:rPr lang="ru-RU" dirty="0" smtClean="0"/>
+              <a:t>&gt; ? если вы используете инструкцию </a:t>
+            </a:r>
+            <a:r>
+              <a:rPr lang="ru-RU" dirty="0" err="1" smtClean="0"/>
+              <a:t>foreach</a:t>
+            </a:r>
+            <a:r>
+              <a:rPr lang="ru-RU" dirty="0" smtClean="0"/>
+              <a:t>, то внутри блока </a:t>
+            </a:r>
+            <a:r>
+              <a:rPr lang="ru-RU" dirty="0" err="1" smtClean="0"/>
+              <a:t>finally</a:t>
+            </a:r>
+            <a:r>
+              <a:rPr lang="ru-RU" dirty="0" smtClean="0"/>
+              <a:t> для объекта</a:t>
+            </a:r>
+          </a:p>
+          <a:p>
+            <a:r>
+              <a:rPr lang="ru-RU" dirty="0" smtClean="0"/>
+              <a:t>&gt; </a:t>
+            </a:r>
+            <a:r>
+              <a:rPr lang="ru-RU" dirty="0" err="1" smtClean="0"/>
+              <a:t>IEnumerator</a:t>
+            </a:r>
+            <a:r>
+              <a:rPr lang="ru-RU" dirty="0" smtClean="0"/>
+              <a:t> вызывается метод </a:t>
+            </a:r>
+            <a:r>
+              <a:rPr lang="ru-RU" dirty="0" err="1" smtClean="0"/>
+              <a:t>Dispose</a:t>
+            </a:r>
+            <a:r>
+              <a:rPr lang="ru-RU" dirty="0" smtClean="0"/>
+              <a:t>;</a:t>
+            </a:r>
+          </a:p>
+          <a:p>
+            <a:r>
+              <a:rPr lang="ru-RU" dirty="0" smtClean="0"/>
+              <a:t>&gt; ? если вы определяете деструктор, то внутри блока </a:t>
+            </a:r>
+            <a:r>
+              <a:rPr lang="ru-RU" dirty="0" err="1" smtClean="0"/>
+              <a:t>finally</a:t>
+            </a:r>
+            <a:r>
+              <a:rPr lang="ru-RU" dirty="0" smtClean="0"/>
+              <a:t> вызывается метод</a:t>
+            </a:r>
+          </a:p>
+          <a:p>
+            <a:r>
+              <a:rPr lang="ru-RU" dirty="0" smtClean="0"/>
+              <a:t>&gt; </a:t>
+            </a:r>
+            <a:r>
+              <a:rPr lang="ru-RU" dirty="0" err="1" smtClean="0"/>
+              <a:t>Finalize</a:t>
+            </a:r>
+            <a:r>
+              <a:rPr lang="ru-RU" dirty="0" smtClean="0"/>
+              <a:t> базового класса.</a:t>
+            </a:r>
             <a:endParaRPr lang="en-US" dirty="0"/>
           </a:p>
         </p:txBody>
@@ -2017,7 +2019,195 @@
     </p:spTree>
     <p:extLst>
       <p:ext uri="{BB962C8B-B14F-4D97-AF65-F5344CB8AC3E}">
+        <p14:creationId xmlns:p14="http://schemas.microsoft.com/office/powerpoint/2010/main" val="1860067769"/>
+      </p:ext>
+    </p:extLst>
+  </p:cSld>
+  <p:clrMapOvr>
+    <a:masterClrMapping/>
+  </p:clrMapOvr>
+</p:notes>
+</file>
+
+<file path=ppt/notesSlides/notesSlide8.xml><?xml version="1.0" encoding="utf-8"?>
+<p:notes xmlns:a="http://schemas.openxmlformats.org/drawingml/2006/main" xmlns:r="http://schemas.openxmlformats.org/officeDocument/2006/relationships" xmlns:p="http://schemas.openxmlformats.org/presentationml/2006/main">
+  <p:cSld>
+    <p:spTree>
+      <p:nvGrpSpPr>
+        <p:cNvPr id="1" name=""/>
+        <p:cNvGrpSpPr/>
+        <p:nvPr/>
+      </p:nvGrpSpPr>
+      <p:grpSpPr>
+        <a:xfrm>
+          <a:off x="0" y="0"/>
+          <a:ext cx="0" cy="0"/>
+          <a:chOff x="0" y="0"/>
+          <a:chExt cx="0" cy="0"/>
+        </a:xfrm>
+      </p:grpSpPr>
+      <p:sp>
+        <p:nvSpPr>
+          <p:cNvPr id="2" name="Образ слайда 1"/>
+          <p:cNvSpPr>
+            <a:spLocks noGrp="1" noRot="1" noChangeAspect="1"/>
+          </p:cNvSpPr>
+          <p:nvPr>
+            <p:ph type="sldImg"/>
+          </p:nvPr>
+        </p:nvSpPr>
+        <p:spPr/>
+      </p:sp>
+      <p:sp>
+        <p:nvSpPr>
+          <p:cNvPr id="3" name="Заметки 2"/>
+          <p:cNvSpPr>
+            <a:spLocks noGrp="1"/>
+          </p:cNvSpPr>
+          <p:nvPr>
+            <p:ph type="body" idx="1"/>
+          </p:nvPr>
+        </p:nvSpPr>
+        <p:spPr/>
+        <p:txBody>
+          <a:bodyPr/>
+          <a:lstStyle/>
+          <a:p>
+            <a:endParaRPr lang="en-US" dirty="0"/>
+          </a:p>
+        </p:txBody>
+      </p:sp>
+      <p:sp>
+        <p:nvSpPr>
+          <p:cNvPr id="4" name="Номер слайда 3"/>
+          <p:cNvSpPr>
+            <a:spLocks noGrp="1"/>
+          </p:cNvSpPr>
+          <p:nvPr>
+            <p:ph type="sldNum" sz="quarter" idx="10"/>
+          </p:nvPr>
+        </p:nvSpPr>
+        <p:spPr/>
+        <p:txBody>
+          <a:bodyPr/>
+          <a:lstStyle/>
+          <a:p>
+            <a:fld id="{26F4D375-ABE6-4939-A45D-A523BC6E81D7}" type="slidenum">
+              <a:rPr lang="en-US" smtClean="0"/>
+              <a:t>9</a:t>
+            </a:fld>
+            <a:endParaRPr lang="en-US"/>
+          </a:p>
+        </p:txBody>
+      </p:sp>
+    </p:spTree>
+    <p:extLst>
+      <p:ext uri="{BB962C8B-B14F-4D97-AF65-F5344CB8AC3E}">
         <p14:creationId xmlns:p14="http://schemas.microsoft.com/office/powerpoint/2010/main" val="2677451807"/>
+      </p:ext>
+    </p:extLst>
+  </p:cSld>
+  <p:clrMapOvr>
+    <a:masterClrMapping/>
+  </p:clrMapOvr>
+</p:notes>
+</file>
+
+<file path=ppt/notesSlides/notesSlide9.xml><?xml version="1.0" encoding="utf-8"?>
+<p:notes xmlns:a="http://schemas.openxmlformats.org/drawingml/2006/main" xmlns:r="http://schemas.openxmlformats.org/officeDocument/2006/relationships" xmlns:p="http://schemas.openxmlformats.org/presentationml/2006/main">
+  <p:cSld>
+    <p:spTree>
+      <p:nvGrpSpPr>
+        <p:cNvPr id="1" name=""/>
+        <p:cNvGrpSpPr/>
+        <p:nvPr/>
+      </p:nvGrpSpPr>
+      <p:grpSpPr>
+        <a:xfrm>
+          <a:off x="0" y="0"/>
+          <a:ext cx="0" cy="0"/>
+          <a:chOff x="0" y="0"/>
+          <a:chExt cx="0" cy="0"/>
+        </a:xfrm>
+      </p:grpSpPr>
+      <p:sp>
+        <p:nvSpPr>
+          <p:cNvPr id="2" name="Образ слайда 1"/>
+          <p:cNvSpPr>
+            <a:spLocks noGrp="1" noRot="1" noChangeAspect="1"/>
+          </p:cNvSpPr>
+          <p:nvPr>
+            <p:ph type="sldImg"/>
+          </p:nvPr>
+        </p:nvSpPr>
+        <p:spPr/>
+      </p:sp>
+      <p:sp>
+        <p:nvSpPr>
+          <p:cNvPr id="3" name="Заметки 2"/>
+          <p:cNvSpPr>
+            <a:spLocks noGrp="1"/>
+          </p:cNvSpPr>
+          <p:nvPr>
+            <p:ph type="body" idx="1"/>
+          </p:nvPr>
+        </p:nvSpPr>
+        <p:spPr/>
+        <p:txBody>
+          <a:bodyPr/>
+          <a:lstStyle/>
+          <a:p>
+            <a:r>
+              <a:rPr lang="ru-RU" dirty="0" smtClean="0"/>
+              <a:t>Рассказать за причины того что оно не отличается. Что </a:t>
+            </a:r>
+            <a:r>
+              <a:rPr lang="en-US" dirty="0" smtClean="0"/>
+              <a:t>throw </a:t>
+            </a:r>
+            <a:r>
+              <a:rPr lang="ru-RU" dirty="0" err="1" smtClean="0"/>
+              <a:t>всеравно</a:t>
+            </a:r>
+            <a:r>
+              <a:rPr lang="ru-RU" dirty="0" smtClean="0"/>
+              <a:t> выполняет </a:t>
+            </a:r>
+            <a:r>
+              <a:rPr lang="ru-RU" smtClean="0"/>
+              <a:t>кетч инструкции, </a:t>
+            </a:r>
+            <a:endParaRPr lang="en-US" dirty="0"/>
+          </a:p>
+        </p:txBody>
+      </p:sp>
+      <p:sp>
+        <p:nvSpPr>
+          <p:cNvPr id="4" name="Номер слайда 3"/>
+          <p:cNvSpPr>
+            <a:spLocks noGrp="1"/>
+          </p:cNvSpPr>
+          <p:nvPr>
+            <p:ph type="sldNum" sz="quarter" idx="10"/>
+          </p:nvPr>
+        </p:nvSpPr>
+        <p:spPr/>
+        <p:txBody>
+          <a:bodyPr/>
+          <a:lstStyle/>
+          <a:p>
+            <a:fld id="{26F4D375-ABE6-4939-A45D-A523BC6E81D7}" type="slidenum">
+              <a:rPr lang="en-US" smtClean="0"/>
+              <a:t>10</a:t>
+            </a:fld>
+            <a:endParaRPr lang="en-US"/>
+          </a:p>
+        </p:txBody>
+      </p:sp>
+    </p:spTree>
+    <p:extLst>
+      <p:ext uri="{BB962C8B-B14F-4D97-AF65-F5344CB8AC3E}">
+        <p14:creationId xmlns:p14="http://schemas.microsoft.com/office/powerpoint/2010/main" val="887822139"/>
       </p:ext>
     </p:extLst>
   </p:cSld>
@@ -6373,6 +6563,208 @@
 </p:sld>
 </file>
 
+<file path=ppt/slides/slide10.xml><?xml version="1.0" encoding="utf-8"?>
+<p:sld xmlns:a="http://schemas.openxmlformats.org/drawingml/2006/main" xmlns:r="http://schemas.openxmlformats.org/officeDocument/2006/relationships" xmlns:p="http://schemas.openxmlformats.org/presentationml/2006/main">
+  <p:cSld>
+    <p:spTree>
+      <p:nvGrpSpPr>
+        <p:cNvPr id="1" name=""/>
+        <p:cNvGrpSpPr/>
+        <p:nvPr/>
+      </p:nvGrpSpPr>
+      <p:grpSpPr>
+        <a:xfrm>
+          <a:off x="0" y="0"/>
+          <a:ext cx="0" cy="0"/>
+          <a:chOff x="0" y="0"/>
+          <a:chExt cx="0" cy="0"/>
+        </a:xfrm>
+      </p:grpSpPr>
+      <p:sp>
+        <p:nvSpPr>
+          <p:cNvPr id="6" name="Заголовок 5"/>
+          <p:cNvSpPr>
+            <a:spLocks noGrp="1"/>
+          </p:cNvSpPr>
+          <p:nvPr>
+            <p:ph type="title"/>
+          </p:nvPr>
+        </p:nvSpPr>
+        <p:spPr>
+          <a:xfrm>
+            <a:off x="469786" y="295516"/>
+            <a:ext cx="8674214" cy="1018572"/>
+          </a:xfrm>
+        </p:spPr>
+        <p:txBody>
+          <a:bodyPr/>
+          <a:lstStyle/>
+          <a:p>
+            <a:r>
+              <a:rPr lang="en-US" dirty="0" smtClean="0"/>
+              <a:t>The throw proble</a:t>
+            </a:r>
+            <a:r>
+              <a:rPr lang="en-US" dirty="0"/>
+              <a:t>m</a:t>
+            </a:r>
+            <a:endParaRPr lang="uk-UA" dirty="0"/>
+          </a:p>
+        </p:txBody>
+      </p:sp>
+      <p:sp>
+        <p:nvSpPr>
+          <p:cNvPr id="2" name="TextBox 1"/>
+          <p:cNvSpPr txBox="1"/>
+          <p:nvPr/>
+        </p:nvSpPr>
+        <p:spPr>
+          <a:xfrm>
+            <a:off x="469786" y="1314088"/>
+            <a:ext cx="8219361" cy="369332"/>
+          </a:xfrm>
+          <a:prstGeom prst="rect">
+            <a:avLst/>
+          </a:prstGeom>
+          <a:noFill/>
+        </p:spPr>
+        <p:txBody>
+          <a:bodyPr wrap="square" rtlCol="0">
+            <a:spAutoFit/>
+          </a:bodyPr>
+          <a:lstStyle/>
+          <a:p>
+            <a:r>
+              <a:rPr lang="en-US" dirty="0" smtClean="0">
+                <a:solidFill>
+                  <a:srgbClr val="000000"/>
+                </a:solidFill>
+              </a:rPr>
+              <a:t>What about adding new Exception in finally</a:t>
+            </a:r>
+            <a:endParaRPr lang="en-US" dirty="0">
+              <a:solidFill>
+                <a:srgbClr val="000000"/>
+              </a:solidFill>
+            </a:endParaRPr>
+          </a:p>
+        </p:txBody>
+      </p:sp>
+      <p:pic>
+        <p:nvPicPr>
+          <p:cNvPr id="4" name="Рисунок 3"/>
+          <p:cNvPicPr>
+            <a:picLocks noChangeAspect="1"/>
+          </p:cNvPicPr>
+          <p:nvPr/>
+        </p:nvPicPr>
+        <p:blipFill>
+          <a:blip r:embed="rId3">
+            <a:extLst>
+              <a:ext uri="{28A0092B-C50C-407E-A947-70E740481C1C}">
+                <a14:useLocalDpi xmlns:a14="http://schemas.microsoft.com/office/drawing/2010/main" val="0"/>
+              </a:ext>
+            </a:extLst>
+          </a:blip>
+          <a:stretch>
+            <a:fillRect/>
+          </a:stretch>
+        </p:blipFill>
+        <p:spPr>
+          <a:xfrm>
+            <a:off x="469786" y="1683419"/>
+            <a:ext cx="8280370" cy="3431505"/>
+          </a:xfrm>
+          <a:prstGeom prst="rect">
+            <a:avLst/>
+          </a:prstGeom>
+        </p:spPr>
+      </p:pic>
+    </p:spTree>
+    <p:extLst>
+      <p:ext uri="{BB962C8B-B14F-4D97-AF65-F5344CB8AC3E}">
+        <p14:creationId xmlns:p14="http://schemas.microsoft.com/office/powerpoint/2010/main" val="714393610"/>
+      </p:ext>
+    </p:extLst>
+  </p:cSld>
+  <p:clrMapOvr>
+    <a:masterClrMapping/>
+  </p:clrMapOvr>
+  <p:timing>
+    <p:tnLst>
+      <p:par>
+        <p:cTn id="1" dur="indefinite" restart="never" nodeType="tmRoot"/>
+      </p:par>
+    </p:tnLst>
+  </p:timing>
+</p:sld>
+</file>
+
+<file path=ppt/slides/slide11.xml><?xml version="1.0" encoding="utf-8"?>
+<p:sld xmlns:a="http://schemas.openxmlformats.org/drawingml/2006/main" xmlns:r="http://schemas.openxmlformats.org/officeDocument/2006/relationships" xmlns:p="http://schemas.openxmlformats.org/presentationml/2006/main">
+  <p:cSld>
+    <p:spTree>
+      <p:nvGrpSpPr>
+        <p:cNvPr id="1" name=""/>
+        <p:cNvGrpSpPr/>
+        <p:nvPr/>
+      </p:nvGrpSpPr>
+      <p:grpSpPr>
+        <a:xfrm>
+          <a:off x="0" y="0"/>
+          <a:ext cx="0" cy="0"/>
+          <a:chOff x="0" y="0"/>
+          <a:chExt cx="0" cy="0"/>
+        </a:xfrm>
+      </p:grpSpPr>
+      <p:sp>
+        <p:nvSpPr>
+          <p:cNvPr id="2" name="Заголовок 1"/>
+          <p:cNvSpPr>
+            <a:spLocks noGrp="1"/>
+          </p:cNvSpPr>
+          <p:nvPr>
+            <p:ph type="title"/>
+          </p:nvPr>
+        </p:nvSpPr>
+        <p:spPr>
+          <a:xfrm>
+            <a:off x="951545" y="628650"/>
+            <a:ext cx="7412652" cy="2829151"/>
+          </a:xfrm>
+        </p:spPr>
+        <p:txBody>
+          <a:bodyPr/>
+          <a:lstStyle/>
+          <a:p>
+            <a:r>
+              <a:rPr lang="en-US" dirty="0" smtClean="0"/>
+              <a:t>That’s about it for now!</a:t>
+            </a:r>
+            <a:endParaRPr lang="uk-UA" dirty="0"/>
+          </a:p>
+        </p:txBody>
+      </p:sp>
+    </p:spTree>
+    <p:extLst>
+      <p:ext uri="{BB962C8B-B14F-4D97-AF65-F5344CB8AC3E}">
+        <p14:creationId xmlns:p14="http://schemas.microsoft.com/office/powerpoint/2010/main" val="837831753"/>
+      </p:ext>
+    </p:extLst>
+  </p:cSld>
+  <p:clrMapOvr>
+    <a:masterClrMapping/>
+  </p:clrMapOvr>
+  <p:timing>
+    <p:tnLst>
+      <p:par>
+        <p:cTn id="1" dur="indefinite" restart="never" nodeType="tmRoot"/>
+      </p:par>
+    </p:tnLst>
+  </p:timing>
+</p:sld>
+</file>
+
 <file path=ppt/slides/slide2.xml><?xml version="1.0" encoding="utf-8"?>
 <p:sld xmlns:a="http://schemas.openxmlformats.org/drawingml/2006/main" xmlns:r="http://schemas.openxmlformats.org/officeDocument/2006/relationships" xmlns:p="http://schemas.openxmlformats.org/presentationml/2006/main">
   <p:cSld>
@@ -6581,7 +6973,6 @@
               <a:rPr lang="en-US" sz="2000" dirty="0" smtClean="0"/>
               <a:t>Looks similar, right?</a:t>
             </a:r>
-            <a:endParaRPr lang="en-US" sz="2000" dirty="0" smtClean="0"/>
           </a:p>
         </p:txBody>
       </p:sp>
@@ -6642,6 +7033,109 @@
 </file>
 
 <file path=ppt/slides/slide4.xml><?xml version="1.0" encoding="utf-8"?>
+<p:sld xmlns:a="http://schemas.openxmlformats.org/drawingml/2006/main" xmlns:r="http://schemas.openxmlformats.org/officeDocument/2006/relationships" xmlns:p="http://schemas.openxmlformats.org/presentationml/2006/main">
+  <p:cSld>
+    <p:spTree>
+      <p:nvGrpSpPr>
+        <p:cNvPr id="1" name=""/>
+        <p:cNvGrpSpPr/>
+        <p:nvPr/>
+      </p:nvGrpSpPr>
+      <p:grpSpPr>
+        <a:xfrm>
+          <a:off x="0" y="0"/>
+          <a:ext cx="0" cy="0"/>
+          <a:chOff x="0" y="0"/>
+          <a:chExt cx="0" cy="0"/>
+        </a:xfrm>
+      </p:grpSpPr>
+      <p:sp>
+        <p:nvSpPr>
+          <p:cNvPr id="8" name="Заголовок 7"/>
+          <p:cNvSpPr>
+            <a:spLocks noGrp="1"/>
+          </p:cNvSpPr>
+          <p:nvPr>
+            <p:ph type="title"/>
+          </p:nvPr>
+        </p:nvSpPr>
+        <p:spPr/>
+        <p:txBody>
+          <a:bodyPr/>
+          <a:lstStyle/>
+          <a:p>
+            <a:pPr algn="ctr"/>
+            <a:r>
+              <a:rPr lang="en-US" dirty="0"/>
+              <a:t>Structured </a:t>
+            </a:r>
+            <a:r>
+              <a:rPr lang="en-US" dirty="0" smtClean="0"/>
+              <a:t>Exception</a:t>
+            </a:r>
+            <a:r>
+              <a:rPr lang="ru-RU" dirty="0" smtClean="0"/>
+              <a:t> </a:t>
+            </a:r>
+            <a:r>
+              <a:rPr lang="en-US" dirty="0" smtClean="0"/>
+              <a:t>Handling</a:t>
+            </a:r>
+            <a:endParaRPr lang="uk-UA" dirty="0"/>
+          </a:p>
+        </p:txBody>
+      </p:sp>
+      <p:pic>
+        <p:nvPicPr>
+          <p:cNvPr id="2" name="Рисунок 1"/>
+          <p:cNvPicPr>
+            <a:picLocks noChangeAspect="1"/>
+          </p:cNvPicPr>
+          <p:nvPr/>
+        </p:nvPicPr>
+        <p:blipFill>
+          <a:blip r:embed="rId3">
+            <a:extLst>
+              <a:ext uri="{28A0092B-C50C-407E-A947-70E740481C1C}">
+                <a14:useLocalDpi xmlns:a14="http://schemas.microsoft.com/office/drawing/2010/main" val="0"/>
+              </a:ext>
+            </a:extLst>
+          </a:blip>
+          <a:stretch>
+            <a:fillRect/>
+          </a:stretch>
+        </p:blipFill>
+        <p:spPr>
+          <a:xfrm>
+            <a:off x="1745252" y="869748"/>
+            <a:ext cx="5727997" cy="5183600"/>
+          </a:xfrm>
+          <a:prstGeom prst="rect">
+            <a:avLst/>
+          </a:prstGeom>
+        </p:spPr>
+      </p:pic>
+    </p:spTree>
+    <p:extLst>
+      <p:ext uri="{BB962C8B-B14F-4D97-AF65-F5344CB8AC3E}">
+        <p14:creationId xmlns:p14="http://schemas.microsoft.com/office/powerpoint/2010/main" val="1517499374"/>
+      </p:ext>
+    </p:extLst>
+  </p:cSld>
+  <p:clrMapOvr>
+    <a:masterClrMapping/>
+  </p:clrMapOvr>
+  <p:timing>
+    <p:tnLst>
+      <p:par>
+        <p:cTn id="1" dur="indefinite" restart="never" nodeType="tmRoot"/>
+      </p:par>
+    </p:tnLst>
+  </p:timing>
+</p:sld>
+</file>
+
+<file path=ppt/slides/slide5.xml><?xml version="1.0" encoding="utf-8"?>
 <p:sld xmlns:a="http://schemas.openxmlformats.org/drawingml/2006/main" xmlns:r="http://schemas.openxmlformats.org/officeDocument/2006/relationships" xmlns:p="http://schemas.openxmlformats.org/presentationml/2006/main">
   <p:cSld>
     <p:spTree>
@@ -6761,7 +7255,7 @@
 </p:sld>
 </file>
 
-<file path=ppt/slides/slide5.xml><?xml version="1.0" encoding="utf-8"?>
+<file path=ppt/slides/slide6.xml><?xml version="1.0" encoding="utf-8"?>
 <p:sld xmlns:a="http://schemas.openxmlformats.org/drawingml/2006/main" xmlns:r="http://schemas.openxmlformats.org/officeDocument/2006/relationships" xmlns:p="http://schemas.openxmlformats.org/presentationml/2006/main">
   <p:cSld>
     <p:spTree>
@@ -6934,7 +7428,7 @@
 </p:sld>
 </file>
 
-<file path=ppt/slides/slide6.xml><?xml version="1.0" encoding="utf-8"?>
+<file path=ppt/slides/slide7.xml><?xml version="1.0" encoding="utf-8"?>
 <p:sld xmlns:a="http://schemas.openxmlformats.org/drawingml/2006/main" xmlns:r="http://schemas.openxmlformats.org/officeDocument/2006/relationships" xmlns:p="http://schemas.openxmlformats.org/presentationml/2006/main">
   <p:cSld>
     <p:spTree>
@@ -7172,7 +7666,7 @@
 </p:sld>
 </file>
 
-<file path=ppt/slides/slide7.xml><?xml version="1.0" encoding="utf-8"?>
+<file path=ppt/slides/slide8.xml><?xml version="1.0" encoding="utf-8"?>
 <p:sld xmlns:a="http://schemas.openxmlformats.org/drawingml/2006/main" xmlns:r="http://schemas.openxmlformats.org/officeDocument/2006/relationships" xmlns:p="http://schemas.openxmlformats.org/presentationml/2006/main">
   <p:cSld>
     <p:spTree>
@@ -7411,7 +7905,7 @@
 </p:sld>
 </file>
 
-<file path=ppt/slides/slide8.xml><?xml version="1.0" encoding="utf-8"?>
+<file path=ppt/slides/slide9.xml><?xml version="1.0" encoding="utf-8"?>
 <p:sld xmlns:a="http://schemas.openxmlformats.org/drawingml/2006/main" xmlns:r="http://schemas.openxmlformats.org/officeDocument/2006/relationships" xmlns:p="http://schemas.openxmlformats.org/presentationml/2006/main">
   <p:cSld>
     <p:spTree>
@@ -7562,66 +8056,6 @@
     <p:extLst>
       <p:ext uri="{BB962C8B-B14F-4D97-AF65-F5344CB8AC3E}">
         <p14:creationId xmlns:p14="http://schemas.microsoft.com/office/powerpoint/2010/main" val="3664289138"/>
-      </p:ext>
-    </p:extLst>
-  </p:cSld>
-  <p:clrMapOvr>
-    <a:masterClrMapping/>
-  </p:clrMapOvr>
-  <p:timing>
-    <p:tnLst>
-      <p:par>
-        <p:cTn id="1" dur="indefinite" restart="never" nodeType="tmRoot"/>
-      </p:par>
-    </p:tnLst>
-  </p:timing>
-</p:sld>
-</file>
-
-<file path=ppt/slides/slide9.xml><?xml version="1.0" encoding="utf-8"?>
-<p:sld xmlns:a="http://schemas.openxmlformats.org/drawingml/2006/main" xmlns:r="http://schemas.openxmlformats.org/officeDocument/2006/relationships" xmlns:p="http://schemas.openxmlformats.org/presentationml/2006/main">
-  <p:cSld>
-    <p:spTree>
-      <p:nvGrpSpPr>
-        <p:cNvPr id="1" name=""/>
-        <p:cNvGrpSpPr/>
-        <p:nvPr/>
-      </p:nvGrpSpPr>
-      <p:grpSpPr>
-        <a:xfrm>
-          <a:off x="0" y="0"/>
-          <a:ext cx="0" cy="0"/>
-          <a:chOff x="0" y="0"/>
-          <a:chExt cx="0" cy="0"/>
-        </a:xfrm>
-      </p:grpSpPr>
-      <p:sp>
-        <p:nvSpPr>
-          <p:cNvPr id="2" name="Заголовок 1"/>
-          <p:cNvSpPr>
-            <a:spLocks noGrp="1"/>
-          </p:cNvSpPr>
-          <p:nvPr>
-            <p:ph type="title"/>
-          </p:nvPr>
-        </p:nvSpPr>
-        <p:spPr/>
-        <p:txBody>
-          <a:bodyPr/>
-          <a:lstStyle/>
-          <a:p>
-            <a:r>
-              <a:rPr lang="en-US" dirty="0" smtClean="0"/>
-              <a:t>That’s about it for now!</a:t>
-            </a:r>
-            <a:endParaRPr lang="uk-UA" dirty="0"/>
-          </a:p>
-        </p:txBody>
-      </p:sp>
-    </p:spTree>
-    <p:extLst>
-      <p:ext uri="{BB962C8B-B14F-4D97-AF65-F5344CB8AC3E}">
-        <p14:creationId xmlns:p14="http://schemas.microsoft.com/office/powerpoint/2010/main" val="837831753"/>
       </p:ext>
     </p:extLst>
   </p:cSld>

</xml_diff>